<commit_message>
Updates to Dec 1 slides
</commit_message>
<xml_diff>
--- a/Slides/120121.pptx
+++ b/Slides/120121.pptx
@@ -5,10 +5,10 @@
     <p:sldMasterId id="2147483648" r:id="rId1"/>
   </p:sldMasterIdLst>
   <p:notesMasterIdLst>
-    <p:notesMasterId r:id="rId48"/>
+    <p:notesMasterId r:id="rId50"/>
   </p:notesMasterIdLst>
   <p:handoutMasterIdLst>
-    <p:handoutMasterId r:id="rId49"/>
+    <p:handoutMasterId r:id="rId51"/>
   </p:handoutMasterIdLst>
   <p:sldIdLst>
     <p:sldId id="258" r:id="rId2"/>
@@ -34,29 +34,31 @@
     <p:sldId id="534" r:id="rId22"/>
     <p:sldId id="535" r:id="rId23"/>
     <p:sldId id="536" r:id="rId24"/>
-    <p:sldId id="537" r:id="rId25"/>
-    <p:sldId id="538" r:id="rId26"/>
-    <p:sldId id="539" r:id="rId27"/>
-    <p:sldId id="540" r:id="rId28"/>
-    <p:sldId id="543" r:id="rId29"/>
-    <p:sldId id="547" r:id="rId30"/>
-    <p:sldId id="548" r:id="rId31"/>
-    <p:sldId id="549" r:id="rId32"/>
-    <p:sldId id="550" r:id="rId33"/>
-    <p:sldId id="551" r:id="rId34"/>
-    <p:sldId id="552" r:id="rId35"/>
-    <p:sldId id="553" r:id="rId36"/>
-    <p:sldId id="554" r:id="rId37"/>
-    <p:sldId id="556" r:id="rId38"/>
-    <p:sldId id="512" r:id="rId39"/>
-    <p:sldId id="558" r:id="rId40"/>
-    <p:sldId id="522" r:id="rId41"/>
-    <p:sldId id="523" r:id="rId42"/>
-    <p:sldId id="541" r:id="rId43"/>
-    <p:sldId id="544" r:id="rId44"/>
-    <p:sldId id="545" r:id="rId45"/>
-    <p:sldId id="546" r:id="rId46"/>
-    <p:sldId id="557" r:id="rId47"/>
+    <p:sldId id="559" r:id="rId25"/>
+    <p:sldId id="560" r:id="rId26"/>
+    <p:sldId id="537" r:id="rId27"/>
+    <p:sldId id="538" r:id="rId28"/>
+    <p:sldId id="539" r:id="rId29"/>
+    <p:sldId id="540" r:id="rId30"/>
+    <p:sldId id="543" r:id="rId31"/>
+    <p:sldId id="547" r:id="rId32"/>
+    <p:sldId id="548" r:id="rId33"/>
+    <p:sldId id="549" r:id="rId34"/>
+    <p:sldId id="550" r:id="rId35"/>
+    <p:sldId id="551" r:id="rId36"/>
+    <p:sldId id="552" r:id="rId37"/>
+    <p:sldId id="553" r:id="rId38"/>
+    <p:sldId id="554" r:id="rId39"/>
+    <p:sldId id="556" r:id="rId40"/>
+    <p:sldId id="512" r:id="rId41"/>
+    <p:sldId id="558" r:id="rId42"/>
+    <p:sldId id="522" r:id="rId43"/>
+    <p:sldId id="523" r:id="rId44"/>
+    <p:sldId id="541" r:id="rId45"/>
+    <p:sldId id="544" r:id="rId46"/>
+    <p:sldId id="545" r:id="rId47"/>
+    <p:sldId id="546" r:id="rId48"/>
+    <p:sldId id="557" r:id="rId49"/>
   </p:sldIdLst>
   <p:sldSz cx="9144000" cy="6858000" type="screen4x3"/>
   <p:notesSz cx="7315200" cy="9601200"/>
@@ -2170,7 +2172,7 @@
             <a:fld id="{A770630E-C6A9-444B-A16B-2B64151D1DEE}" type="slidenum">
               <a:rPr lang="en-US" smtClean="0"/>
               <a:pPr/>
-              <a:t>26</a:t>
+              <a:t>28</a:t>
             </a:fld>
             <a:endParaRPr lang="en-US"/>
           </a:p>
@@ -2257,7 +2259,7 @@
             <a:fld id="{9026EA2B-EFC1-4DB2-A297-B21C4C7A67B1}" type="slidenum">
               <a:rPr lang="en-US" smtClean="0"/>
               <a:pPr/>
-              <a:t>27</a:t>
+              <a:t>29</a:t>
             </a:fld>
             <a:endParaRPr lang="en-US"/>
           </a:p>
@@ -2344,7 +2346,7 @@
             <a:fld id="{A770630E-C6A9-444B-A16B-2B64151D1DEE}" type="slidenum">
               <a:rPr lang="en-US" smtClean="0"/>
               <a:pPr/>
-              <a:t>28</a:t>
+              <a:t>30</a:t>
             </a:fld>
             <a:endParaRPr lang="en-US"/>
           </a:p>
@@ -2428,7 +2430,7 @@
           <a:p>
             <a:fld id="{A5230A9A-2637-4F4B-B8F8-240F39B08293}" type="slidenum">
               <a:rPr lang="en-US" smtClean="0"/>
-              <a:t>30</a:t>
+              <a:t>32</a:t>
             </a:fld>
             <a:endParaRPr lang="en-US"/>
           </a:p>
@@ -2512,7 +2514,7 @@
           <a:p>
             <a:fld id="{A5230A9A-2637-4F4B-B8F8-240F39B08293}" type="slidenum">
               <a:rPr lang="en-US" smtClean="0"/>
-              <a:t>31</a:t>
+              <a:t>33</a:t>
             </a:fld>
             <a:endParaRPr lang="en-US"/>
           </a:p>
@@ -2646,7 +2648,7 @@
                 <a:latin typeface="Calibri"/>
               </a:rPr>
               <a:pPr/>
-              <a:t>35</a:t>
+              <a:t>37</a:t>
             </a:fld>
             <a:endParaRPr lang="en-US">
               <a:solidFill>
@@ -2864,7 +2866,7 @@
           <a:p>
             <a:fld id="{DF61EA0F-A667-4B49-8422-0062BC55E249}" type="slidenum">
               <a:rPr lang="en-US" smtClean="0"/>
-              <a:t>37</a:t>
+              <a:t>39</a:t>
             </a:fld>
             <a:endParaRPr lang="en-US"/>
           </a:p>
@@ -3034,7 +3036,7 @@
             <a:fld id="{C7E9A20B-E167-2E4E-BE18-AA9F5BF5FBB1}" type="slidenum">
               <a:rPr lang="en-US" smtClean="0"/>
               <a:pPr/>
-              <a:t>38</a:t>
+              <a:t>40</a:t>
             </a:fld>
             <a:endParaRPr lang="en-US"/>
           </a:p>
@@ -3121,7 +3123,7 @@
             <a:fld id="{A770630E-C6A9-444B-A16B-2B64151D1DEE}" type="slidenum">
               <a:rPr lang="en-US" smtClean="0"/>
               <a:pPr/>
-              <a:t>44</a:t>
+              <a:t>46</a:t>
             </a:fld>
             <a:endParaRPr lang="en-US"/>
           </a:p>
@@ -3205,7 +3207,7 @@
           <a:p>
             <a:fld id="{A0E88F11-916A-C446-A3D3-EB791675F867}" type="slidenum">
               <a:rPr lang="en-US" smtClean="0"/>
-              <a:t>45</a:t>
+              <a:t>47</a:t>
             </a:fld>
             <a:endParaRPr lang="en-US"/>
           </a:p>
@@ -22401,7 +22403,7 @@
       </p:grpSpPr>
       <p:sp>
         <p:nvSpPr>
-          <p:cNvPr id="2" name="Title 1"/>
+          <p:cNvPr id="7" name="Title 6"/>
           <p:cNvSpPr>
             <a:spLocks noGrp="1"/>
           </p:cNvSpPr>
@@ -22416,19 +22418,19 @@
           <a:p>
             <a:r>
               <a:rPr lang="en-US" dirty="0"/>
-              <a:t>Agenda</a:t>
-            </a:r>
-          </a:p>
-        </p:txBody>
-      </p:sp>
-      <p:sp>
-        <p:nvSpPr>
-          <p:cNvPr id="3" name="Content Placeholder 2"/>
+              <a:t>5-minute break!</a:t>
+            </a:r>
+          </a:p>
+        </p:txBody>
+      </p:sp>
+      <p:sp>
+        <p:nvSpPr>
+          <p:cNvPr id="8" name="Text Placeholder 7"/>
           <p:cNvSpPr>
             <a:spLocks noGrp="1"/>
           </p:cNvSpPr>
           <p:nvPr>
-            <p:ph idx="1"/>
+            <p:ph type="body" idx="1"/>
           </p:nvPr>
         </p:nvSpPr>
         <p:spPr/>
@@ -22436,56 +22438,7 @@
           <a:bodyPr/>
           <a:lstStyle/>
           <a:p>
-            <a:r>
-              <a:rPr lang="en-US" dirty="0"/>
-              <a:t>Networking in modern datacenters</a:t>
-            </a:r>
-          </a:p>
-          <a:p>
-            <a:pPr lvl="1"/>
-            <a:r>
-              <a:rPr lang="en-US" dirty="0"/>
-              <a:t>L2/L3 design</a:t>
-            </a:r>
-          </a:p>
-          <a:p>
-            <a:pPr lvl="2"/>
-            <a:r>
-              <a:rPr lang="en-US" dirty="0"/>
-              <a:t>Addressing / routing / forwarding in the Fat-Tree</a:t>
-            </a:r>
-          </a:p>
-          <a:p>
-            <a:pPr lvl="1"/>
-            <a:r>
-              <a:rPr lang="en-US" dirty="0">
-                <a:solidFill>
-                  <a:srgbClr val="0000FF"/>
-                </a:solidFill>
-              </a:rPr>
-              <a:t>L4 design</a:t>
-            </a:r>
-          </a:p>
-          <a:p>
-            <a:pPr lvl="2"/>
-            <a:r>
-              <a:rPr lang="en-US" dirty="0"/>
-              <a:t>Transport protocol design (w/ Fat-Tree)</a:t>
-            </a:r>
-          </a:p>
-          <a:p>
-            <a:pPr lvl="1"/>
-            <a:r>
-              <a:rPr lang="en-US" dirty="0"/>
-              <a:t>L7 design</a:t>
-            </a:r>
-          </a:p>
-          <a:p>
-            <a:pPr lvl="2"/>
-            <a:r>
-              <a:rPr lang="en-US" dirty="0"/>
-              <a:t>Exploiting application-level information (w/ Fat-Tree)</a:t>
-            </a:r>
+            <a:endParaRPr lang="en-US"/>
           </a:p>
         </p:txBody>
       </p:sp>
@@ -22541,13 +22494,7 @@
       </p:sp>
       <p:sp>
         <p:nvSpPr>
-          <p:cNvPr id="7" name="Slide Number Placeholder 6">
-            <a:extLst>
-              <a:ext uri="{FF2B5EF4-FFF2-40B4-BE49-F238E27FC236}">
-                <a16:creationId xmlns:a16="http://schemas.microsoft.com/office/drawing/2014/main" id="{1603C72F-C854-5945-87AB-B3EC1FBA9AE9}"/>
-              </a:ext>
-            </a:extLst>
-          </p:cNvPr>
+          <p:cNvPr id="6" name="Slide Number Placeholder 5"/>
           <p:cNvSpPr>
             <a:spLocks noGrp="1"/>
           </p:cNvSpPr>
@@ -22572,7 +22519,7 @@
     </p:spTree>
     <p:extLst>
       <p:ext uri="{BB962C8B-B14F-4D97-AF65-F5344CB8AC3E}">
-        <p14:creationId xmlns:p14="http://schemas.microsoft.com/office/powerpoint/2010/main" val="1351746584"/>
+        <p14:creationId xmlns:p14="http://schemas.microsoft.com/office/powerpoint/2010/main" val="59892220"/>
       </p:ext>
     </p:extLst>
   </p:cSld>
@@ -22601,6 +22548,412 @@
       </p:grpSpPr>
       <p:sp>
         <p:nvSpPr>
+          <p:cNvPr id="7" name="Title 6"/>
+          <p:cNvSpPr>
+            <a:spLocks noGrp="1"/>
+          </p:cNvSpPr>
+          <p:nvPr>
+            <p:ph type="title"/>
+          </p:nvPr>
+        </p:nvSpPr>
+        <p:spPr/>
+        <p:txBody>
+          <a:bodyPr/>
+          <a:lstStyle/>
+          <a:p>
+            <a:r>
+              <a:rPr lang="en-US" dirty="0"/>
+              <a:t>Announcements</a:t>
+            </a:r>
+          </a:p>
+        </p:txBody>
+      </p:sp>
+      <p:sp>
+        <p:nvSpPr>
+          <p:cNvPr id="8" name="Content Placeholder 7"/>
+          <p:cNvSpPr>
+            <a:spLocks noGrp="1"/>
+          </p:cNvSpPr>
+          <p:nvPr>
+            <p:ph idx="1"/>
+          </p:nvPr>
+        </p:nvSpPr>
+        <p:spPr/>
+        <p:txBody>
+          <a:bodyPr/>
+          <a:lstStyle/>
+          <a:p>
+            <a:r>
+              <a:rPr lang="en-US" dirty="0"/>
+              <a:t>Sign up for final exam</a:t>
+            </a:r>
+          </a:p>
+          <a:p>
+            <a:pPr lvl="1"/>
+            <a:r>
+              <a:rPr lang="en-US" dirty="0">
+                <a:solidFill>
+                  <a:srgbClr val="0000FF"/>
+                </a:solidFill>
+              </a:rPr>
+              <a:t>https://</a:t>
+            </a:r>
+            <a:r>
+              <a:rPr lang="en-US" dirty="0" err="1">
+                <a:solidFill>
+                  <a:srgbClr val="0000FF"/>
+                </a:solidFill>
+              </a:rPr>
+              <a:t>forms.gle</a:t>
+            </a:r>
+            <a:r>
+              <a:rPr lang="en-US" dirty="0">
+                <a:solidFill>
+                  <a:srgbClr val="0000FF"/>
+                </a:solidFill>
+              </a:rPr>
+              <a:t>/WBfVY2qsybbzV4ZeA</a:t>
+            </a:r>
+          </a:p>
+          <a:p>
+            <a:endParaRPr lang="en-US" dirty="0"/>
+          </a:p>
+          <a:p>
+            <a:r>
+              <a:rPr lang="en-US" dirty="0"/>
+              <a:t>Teaching evaluations</a:t>
+            </a:r>
+          </a:p>
+          <a:p>
+            <a:pPr lvl="1"/>
+            <a:r>
+              <a:rPr lang="en-US" dirty="0"/>
+              <a:t>75% or higher completion rate will result in </a:t>
+            </a:r>
+            <a:r>
+              <a:rPr lang="en-US" dirty="0">
+                <a:solidFill>
+                  <a:srgbClr val="0000FF"/>
+                </a:solidFill>
+              </a:rPr>
+              <a:t>+1 on the final grade for everyone</a:t>
+            </a:r>
+          </a:p>
+          <a:p>
+            <a:endParaRPr lang="en-US" dirty="0">
+              <a:solidFill>
+                <a:srgbClr val="0000FF"/>
+              </a:solidFill>
+            </a:endParaRPr>
+          </a:p>
+        </p:txBody>
+      </p:sp>
+      <p:sp>
+        <p:nvSpPr>
+          <p:cNvPr id="4" name="Date Placeholder 3"/>
+          <p:cNvSpPr>
+            <a:spLocks noGrp="1"/>
+          </p:cNvSpPr>
+          <p:nvPr>
+            <p:ph type="dt" sz="half" idx="10"/>
+          </p:nvPr>
+        </p:nvSpPr>
+        <p:spPr/>
+        <p:txBody>
+          <a:bodyPr/>
+          <a:lstStyle/>
+          <a:p>
+            <a:r>
+              <a:rPr lang="en-US"/>
+              <a:t>December 1, 2021</a:t>
+            </a:r>
+            <a:endParaRPr lang="en-US" sz="1050" b="0">
+              <a:latin typeface="Times New Roman" charset="0"/>
+            </a:endParaRPr>
+          </a:p>
+        </p:txBody>
+      </p:sp>
+      <p:sp>
+        <p:nvSpPr>
+          <p:cNvPr id="5" name="Footer Placeholder 4"/>
+          <p:cNvSpPr>
+            <a:spLocks noGrp="1"/>
+          </p:cNvSpPr>
+          <p:nvPr>
+            <p:ph type="ftr" sz="quarter" idx="11"/>
+          </p:nvPr>
+        </p:nvSpPr>
+        <p:spPr/>
+        <p:txBody>
+          <a:bodyPr/>
+          <a:lstStyle/>
+          <a:p>
+            <a:r>
+              <a:rPr lang="en-US"/>
+              <a:t>EECS 489 – Lecture 20</a:t>
+            </a:r>
+            <a:endParaRPr lang="en-US" sz="1050" b="0">
+              <a:latin typeface="Times New Roman" charset="0"/>
+            </a:endParaRPr>
+          </a:p>
+        </p:txBody>
+      </p:sp>
+      <p:sp>
+        <p:nvSpPr>
+          <p:cNvPr id="6" name="Slide Number Placeholder 5"/>
+          <p:cNvSpPr>
+            <a:spLocks noGrp="1"/>
+          </p:cNvSpPr>
+          <p:nvPr>
+            <p:ph type="sldNum" sz="quarter" idx="12"/>
+          </p:nvPr>
+        </p:nvSpPr>
+        <p:spPr/>
+        <p:txBody>
+          <a:bodyPr/>
+          <a:lstStyle/>
+          <a:p>
+            <a:fld id="{81F2EB77-FB6C-2244-A076-ADF097535D48}" type="slidenum">
+              <a:rPr lang="en-US" smtClean="0"/>
+              <a:pPr/>
+              <a:t>25</a:t>
+            </a:fld>
+            <a:endParaRPr lang="en-US"/>
+          </a:p>
+        </p:txBody>
+      </p:sp>
+    </p:spTree>
+    <p:extLst>
+      <p:ext uri="{BB962C8B-B14F-4D97-AF65-F5344CB8AC3E}">
+        <p14:creationId xmlns:p14="http://schemas.microsoft.com/office/powerpoint/2010/main" val="1586194744"/>
+      </p:ext>
+    </p:extLst>
+  </p:cSld>
+  <p:clrMapOvr>
+    <a:masterClrMapping/>
+  </p:clrMapOvr>
+</p:sld>
+</file>
+
+<file path=ppt/slides/slide26.xml><?xml version="1.0" encoding="utf-8"?>
+<p:sld xmlns:a="http://schemas.openxmlformats.org/drawingml/2006/main" xmlns:r="http://schemas.openxmlformats.org/officeDocument/2006/relationships" xmlns:p="http://schemas.openxmlformats.org/presentationml/2006/main">
+  <p:cSld>
+    <p:spTree>
+      <p:nvGrpSpPr>
+        <p:cNvPr id="1" name=""/>
+        <p:cNvGrpSpPr/>
+        <p:nvPr/>
+      </p:nvGrpSpPr>
+      <p:grpSpPr>
+        <a:xfrm>
+          <a:off x="0" y="0"/>
+          <a:ext cx="0" cy="0"/>
+          <a:chOff x="0" y="0"/>
+          <a:chExt cx="0" cy="0"/>
+        </a:xfrm>
+      </p:grpSpPr>
+      <p:sp>
+        <p:nvSpPr>
+          <p:cNvPr id="2" name="Title 1"/>
+          <p:cNvSpPr>
+            <a:spLocks noGrp="1"/>
+          </p:cNvSpPr>
+          <p:nvPr>
+            <p:ph type="title"/>
+          </p:nvPr>
+        </p:nvSpPr>
+        <p:spPr/>
+        <p:txBody>
+          <a:bodyPr/>
+          <a:lstStyle/>
+          <a:p>
+            <a:r>
+              <a:rPr lang="en-US" dirty="0"/>
+              <a:t>Agenda</a:t>
+            </a:r>
+          </a:p>
+        </p:txBody>
+      </p:sp>
+      <p:sp>
+        <p:nvSpPr>
+          <p:cNvPr id="3" name="Content Placeholder 2"/>
+          <p:cNvSpPr>
+            <a:spLocks noGrp="1"/>
+          </p:cNvSpPr>
+          <p:nvPr>
+            <p:ph idx="1"/>
+          </p:nvPr>
+        </p:nvSpPr>
+        <p:spPr/>
+        <p:txBody>
+          <a:bodyPr/>
+          <a:lstStyle/>
+          <a:p>
+            <a:r>
+              <a:rPr lang="en-US" dirty="0"/>
+              <a:t>Networking in modern datacenters</a:t>
+            </a:r>
+          </a:p>
+          <a:p>
+            <a:pPr lvl="1"/>
+            <a:r>
+              <a:rPr lang="en-US" dirty="0"/>
+              <a:t>L2/L3 design</a:t>
+            </a:r>
+          </a:p>
+          <a:p>
+            <a:pPr lvl="2"/>
+            <a:r>
+              <a:rPr lang="en-US" dirty="0"/>
+              <a:t>Addressing / routing / forwarding in the Fat-Tree</a:t>
+            </a:r>
+          </a:p>
+          <a:p>
+            <a:pPr lvl="1"/>
+            <a:r>
+              <a:rPr lang="en-US" dirty="0">
+                <a:solidFill>
+                  <a:srgbClr val="0000FF"/>
+                </a:solidFill>
+              </a:rPr>
+              <a:t>L4 design</a:t>
+            </a:r>
+          </a:p>
+          <a:p>
+            <a:pPr lvl="2"/>
+            <a:r>
+              <a:rPr lang="en-US" dirty="0"/>
+              <a:t>Transport protocol design (w/ Fat-Tree)</a:t>
+            </a:r>
+          </a:p>
+          <a:p>
+            <a:pPr lvl="1"/>
+            <a:r>
+              <a:rPr lang="en-US" dirty="0"/>
+              <a:t>L7 design</a:t>
+            </a:r>
+          </a:p>
+          <a:p>
+            <a:pPr lvl="2"/>
+            <a:r>
+              <a:rPr lang="en-US" dirty="0"/>
+              <a:t>Exploiting application-level information (w/ Fat-Tree)</a:t>
+            </a:r>
+          </a:p>
+        </p:txBody>
+      </p:sp>
+      <p:sp>
+        <p:nvSpPr>
+          <p:cNvPr id="4" name="Date Placeholder 3"/>
+          <p:cNvSpPr>
+            <a:spLocks noGrp="1"/>
+          </p:cNvSpPr>
+          <p:nvPr>
+            <p:ph type="dt" sz="half" idx="10"/>
+          </p:nvPr>
+        </p:nvSpPr>
+        <p:spPr/>
+        <p:txBody>
+          <a:bodyPr/>
+          <a:lstStyle/>
+          <a:p>
+            <a:r>
+              <a:rPr lang="en-US"/>
+              <a:t>December 1, 2021</a:t>
+            </a:r>
+            <a:endParaRPr lang="en-US" sz="1050" b="0">
+              <a:latin typeface="Times New Roman" charset="0"/>
+            </a:endParaRPr>
+          </a:p>
+        </p:txBody>
+      </p:sp>
+      <p:sp>
+        <p:nvSpPr>
+          <p:cNvPr id="5" name="Footer Placeholder 4"/>
+          <p:cNvSpPr>
+            <a:spLocks noGrp="1"/>
+          </p:cNvSpPr>
+          <p:nvPr>
+            <p:ph type="ftr" sz="quarter" idx="11"/>
+          </p:nvPr>
+        </p:nvSpPr>
+        <p:spPr/>
+        <p:txBody>
+          <a:bodyPr/>
+          <a:lstStyle/>
+          <a:p>
+            <a:r>
+              <a:rPr lang="en-US"/>
+              <a:t>EECS 489 – Lecture 20</a:t>
+            </a:r>
+            <a:endParaRPr lang="en-US" sz="1050" b="0">
+              <a:latin typeface="Times New Roman" charset="0"/>
+            </a:endParaRPr>
+          </a:p>
+        </p:txBody>
+      </p:sp>
+      <p:sp>
+        <p:nvSpPr>
+          <p:cNvPr id="7" name="Slide Number Placeholder 6">
+            <a:extLst>
+              <a:ext uri="{FF2B5EF4-FFF2-40B4-BE49-F238E27FC236}">
+                <a16:creationId xmlns:a16="http://schemas.microsoft.com/office/drawing/2014/main" id="{1603C72F-C854-5945-87AB-B3EC1FBA9AE9}"/>
+              </a:ext>
+            </a:extLst>
+          </p:cNvPr>
+          <p:cNvSpPr>
+            <a:spLocks noGrp="1"/>
+          </p:cNvSpPr>
+          <p:nvPr>
+            <p:ph type="sldNum" sz="quarter" idx="12"/>
+          </p:nvPr>
+        </p:nvSpPr>
+        <p:spPr/>
+        <p:txBody>
+          <a:bodyPr/>
+          <a:lstStyle/>
+          <a:p>
+            <a:fld id="{A190D881-957A-7944-A8D0-1584E528B88F}" type="slidenum">
+              <a:rPr lang="en-US" smtClean="0"/>
+              <a:pPr/>
+              <a:t>26</a:t>
+            </a:fld>
+            <a:endParaRPr lang="en-US"/>
+          </a:p>
+        </p:txBody>
+      </p:sp>
+    </p:spTree>
+    <p:extLst>
+      <p:ext uri="{BB962C8B-B14F-4D97-AF65-F5344CB8AC3E}">
+        <p14:creationId xmlns:p14="http://schemas.microsoft.com/office/powerpoint/2010/main" val="1351746584"/>
+      </p:ext>
+    </p:extLst>
+  </p:cSld>
+  <p:clrMapOvr>
+    <a:masterClrMapping/>
+  </p:clrMapOvr>
+</p:sld>
+</file>
+
+<file path=ppt/slides/slide27.xml><?xml version="1.0" encoding="utf-8"?>
+<p:sld xmlns:a="http://schemas.openxmlformats.org/drawingml/2006/main" xmlns:r="http://schemas.openxmlformats.org/officeDocument/2006/relationships" xmlns:p="http://schemas.openxmlformats.org/presentationml/2006/main">
+  <p:cSld>
+    <p:spTree>
+      <p:nvGrpSpPr>
+        <p:cNvPr id="1" name=""/>
+        <p:cNvGrpSpPr/>
+        <p:nvPr/>
+      </p:nvGrpSpPr>
+      <p:grpSpPr>
+        <a:xfrm>
+          <a:off x="0" y="0"/>
+          <a:ext cx="0" cy="0"/>
+          <a:chOff x="0" y="0"/>
+          <a:chExt cx="0" cy="0"/>
+        </a:xfrm>
+      </p:grpSpPr>
+      <p:sp>
+        <p:nvSpPr>
           <p:cNvPr id="2" name="Title 1"/>
           <p:cNvSpPr>
             <a:spLocks noGrp="1"/>
@@ -22759,7 +23112,7 @@
             <a:fld id="{A190D881-957A-7944-A8D0-1584E528B88F}" type="slidenum">
               <a:rPr lang="en-US" smtClean="0"/>
               <a:pPr/>
-              <a:t>25</a:t>
+              <a:t>27</a:t>
             </a:fld>
             <a:endParaRPr lang="en-US"/>
           </a:p>
@@ -22968,7 +23321,7 @@
 </p:sld>
 </file>
 
-<file path=ppt/slides/slide26.xml><?xml version="1.0" encoding="utf-8"?>
+<file path=ppt/slides/slide28.xml><?xml version="1.0" encoding="utf-8"?>
 <p:sld xmlns:a="http://schemas.openxmlformats.org/drawingml/2006/main" xmlns:r="http://schemas.openxmlformats.org/officeDocument/2006/relationships" xmlns:p="http://schemas.openxmlformats.org/presentationml/2006/main">
   <p:cSld>
     <p:spTree>
@@ -23295,7 +23648,7 @@
             <a:fld id="{D11CF967-1287-0948-92AE-55309D196149}" type="slidenum">
               <a:rPr lang="en-US" smtClean="0"/>
               <a:pPr/>
-              <a:t>26</a:t>
+              <a:t>28</a:t>
             </a:fld>
             <a:endParaRPr lang="en-US"/>
           </a:p>
@@ -23396,7 +23749,7 @@
 </p:sld>
 </file>
 
-<file path=ppt/slides/slide27.xml><?xml version="1.0" encoding="utf-8"?>
+<file path=ppt/slides/slide29.xml><?xml version="1.0" encoding="utf-8"?>
 <p:sld xmlns:a="http://schemas.openxmlformats.org/drawingml/2006/main" xmlns:r="http://schemas.openxmlformats.org/officeDocument/2006/relationships" xmlns:p="http://schemas.openxmlformats.org/presentationml/2006/main">
   <p:cSld>
     <p:spTree>
@@ -23555,7 +23908,7 @@
             <a:fld id="{A190D881-957A-7944-A8D0-1584E528B88F}" type="slidenum">
               <a:rPr lang="en-US" smtClean="0"/>
               <a:pPr/>
-              <a:t>27</a:t>
+              <a:t>29</a:t>
             </a:fld>
             <a:endParaRPr lang="en-US"/>
           </a:p>
@@ -23575,7 +23928,179 @@
 </p:sld>
 </file>
 
-<file path=ppt/slides/slide28.xml><?xml version="1.0" encoding="utf-8"?>
+<file path=ppt/slides/slide3.xml><?xml version="1.0" encoding="utf-8"?>
+<p:sld xmlns:a="http://schemas.openxmlformats.org/drawingml/2006/main" xmlns:r="http://schemas.openxmlformats.org/officeDocument/2006/relationships" xmlns:p="http://schemas.openxmlformats.org/presentationml/2006/main">
+  <p:cSld>
+    <p:spTree>
+      <p:nvGrpSpPr>
+        <p:cNvPr id="1" name=""/>
+        <p:cNvGrpSpPr/>
+        <p:nvPr/>
+      </p:nvGrpSpPr>
+      <p:grpSpPr>
+        <a:xfrm>
+          <a:off x="0" y="0"/>
+          <a:ext cx="0" cy="0"/>
+          <a:chOff x="0" y="0"/>
+          <a:chExt cx="0" cy="0"/>
+        </a:xfrm>
+      </p:grpSpPr>
+      <p:sp>
+        <p:nvSpPr>
+          <p:cNvPr id="2" name="Title 1"/>
+          <p:cNvSpPr>
+            <a:spLocks noGrp="1"/>
+          </p:cNvSpPr>
+          <p:nvPr>
+            <p:ph type="title"/>
+          </p:nvPr>
+        </p:nvSpPr>
+        <p:spPr/>
+        <p:txBody>
+          <a:bodyPr/>
+          <a:lstStyle/>
+          <a:p>
+            <a:r>
+              <a:rPr lang="en-US" dirty="0"/>
+              <a:t>Recap: Datacenter network requirements</a:t>
+            </a:r>
+          </a:p>
+        </p:txBody>
+      </p:sp>
+      <p:sp>
+        <p:nvSpPr>
+          <p:cNvPr id="3" name="Content Placeholder 2"/>
+          <p:cNvSpPr>
+            <a:spLocks noGrp="1"/>
+          </p:cNvSpPr>
+          <p:nvPr>
+            <p:ph idx="1"/>
+          </p:nvPr>
+        </p:nvSpPr>
+        <p:spPr/>
+        <p:txBody>
+          <a:bodyPr/>
+          <a:lstStyle/>
+          <a:p>
+            <a:r>
+              <a:rPr lang="en-US" dirty="0"/>
+              <a:t>High “bisection bandwidth”</a:t>
+            </a:r>
+          </a:p>
+          <a:p>
+            <a:r>
+              <a:rPr lang="en-US" dirty="0"/>
+              <a:t>Low latency, even in the worst-case</a:t>
+            </a:r>
+          </a:p>
+          <a:p>
+            <a:r>
+              <a:rPr lang="en-US" dirty="0"/>
+              <a:t>Large scale </a:t>
+            </a:r>
+          </a:p>
+          <a:p>
+            <a:r>
+              <a:rPr lang="en-US" dirty="0"/>
+              <a:t>Low cost</a:t>
+            </a:r>
+          </a:p>
+        </p:txBody>
+      </p:sp>
+      <p:sp>
+        <p:nvSpPr>
+          <p:cNvPr id="6" name="Date Placeholder 5"/>
+          <p:cNvSpPr>
+            <a:spLocks noGrp="1"/>
+          </p:cNvSpPr>
+          <p:nvPr>
+            <p:ph type="dt" sz="half" idx="10"/>
+          </p:nvPr>
+        </p:nvSpPr>
+        <p:spPr/>
+        <p:txBody>
+          <a:bodyPr/>
+          <a:lstStyle/>
+          <a:p>
+            <a:r>
+              <a:rPr lang="en-US"/>
+              <a:t>December 1, 2021</a:t>
+            </a:r>
+            <a:endParaRPr lang="en-US" sz="1050" b="0">
+              <a:latin typeface="Times New Roman" charset="0"/>
+            </a:endParaRPr>
+          </a:p>
+        </p:txBody>
+      </p:sp>
+      <p:sp>
+        <p:nvSpPr>
+          <p:cNvPr id="7" name="Footer Placeholder 6"/>
+          <p:cNvSpPr>
+            <a:spLocks noGrp="1"/>
+          </p:cNvSpPr>
+          <p:nvPr>
+            <p:ph type="ftr" sz="quarter" idx="11"/>
+          </p:nvPr>
+        </p:nvSpPr>
+        <p:spPr/>
+        <p:txBody>
+          <a:bodyPr/>
+          <a:lstStyle/>
+          <a:p>
+            <a:r>
+              <a:rPr lang="en-US"/>
+              <a:t>EECS 489 – Lecture 20</a:t>
+            </a:r>
+            <a:endParaRPr lang="en-US" sz="1050" b="0">
+              <a:latin typeface="Times New Roman" charset="0"/>
+            </a:endParaRPr>
+          </a:p>
+        </p:txBody>
+      </p:sp>
+      <p:sp>
+        <p:nvSpPr>
+          <p:cNvPr id="4" name="Slide Number Placeholder 3">
+            <a:extLst>
+              <a:ext uri="{FF2B5EF4-FFF2-40B4-BE49-F238E27FC236}">
+                <a16:creationId xmlns:a16="http://schemas.microsoft.com/office/drawing/2014/main" id="{AF8AD4BD-624C-AC4B-B619-74ACA9D0AF72}"/>
+              </a:ext>
+            </a:extLst>
+          </p:cNvPr>
+          <p:cNvSpPr>
+            <a:spLocks noGrp="1"/>
+          </p:cNvSpPr>
+          <p:nvPr>
+            <p:ph type="sldNum" sz="quarter" idx="12"/>
+          </p:nvPr>
+        </p:nvSpPr>
+        <p:spPr/>
+        <p:txBody>
+          <a:bodyPr/>
+          <a:lstStyle/>
+          <a:p>
+            <a:fld id="{A190D881-957A-7944-A8D0-1584E528B88F}" type="slidenum">
+              <a:rPr lang="en-US" smtClean="0"/>
+              <a:pPr/>
+              <a:t>3</a:t>
+            </a:fld>
+            <a:endParaRPr lang="en-US"/>
+          </a:p>
+        </p:txBody>
+      </p:sp>
+    </p:spTree>
+    <p:extLst>
+      <p:ext uri="{BB962C8B-B14F-4D97-AF65-F5344CB8AC3E}">
+        <p14:creationId xmlns:p14="http://schemas.microsoft.com/office/powerpoint/2010/main" val="1862289730"/>
+      </p:ext>
+    </p:extLst>
+  </p:cSld>
+  <p:clrMapOvr>
+    <a:masterClrMapping/>
+  </p:clrMapOvr>
+</p:sld>
+</file>
+
+<file path=ppt/slides/slide30.xml><?xml version="1.0" encoding="utf-8"?>
 <p:sld xmlns:a="http://schemas.openxmlformats.org/drawingml/2006/main" xmlns:r="http://schemas.openxmlformats.org/officeDocument/2006/relationships" xmlns:p="http://schemas.openxmlformats.org/presentationml/2006/main">
   <p:cSld>
     <p:spTree>
@@ -24681,7 +25206,7 @@
             <a:fld id="{A190D881-957A-7944-A8D0-1584E528B88F}" type="slidenum">
               <a:rPr lang="en-US" smtClean="0"/>
               <a:pPr/>
-              <a:t>28</a:t>
+              <a:t>30</a:t>
             </a:fld>
             <a:endParaRPr lang="en-US"/>
           </a:p>
@@ -24884,7 +25409,7 @@
 </p:sld>
 </file>
 
-<file path=ppt/slides/slide29.xml><?xml version="1.0" encoding="utf-8"?>
+<file path=ppt/slides/slide31.xml><?xml version="1.0" encoding="utf-8"?>
 <p:sld xmlns:a="http://schemas.openxmlformats.org/drawingml/2006/main" xmlns:r="http://schemas.openxmlformats.org/officeDocument/2006/relationships" xmlns:p="http://schemas.openxmlformats.org/presentationml/2006/main">
   <p:cSld>
     <p:spTree>
@@ -25019,7 +25544,7 @@
             <a:fld id="{A190D881-957A-7944-A8D0-1584E528B88F}" type="slidenum">
               <a:rPr lang="en-US" smtClean="0"/>
               <a:pPr/>
-              <a:t>29</a:t>
+              <a:t>31</a:t>
             </a:fld>
             <a:endParaRPr lang="en-US"/>
           </a:p>
@@ -25038,179 +25563,7 @@
 </p:sld>
 </file>
 
-<file path=ppt/slides/slide3.xml><?xml version="1.0" encoding="utf-8"?>
-<p:sld xmlns:a="http://schemas.openxmlformats.org/drawingml/2006/main" xmlns:r="http://schemas.openxmlformats.org/officeDocument/2006/relationships" xmlns:p="http://schemas.openxmlformats.org/presentationml/2006/main">
-  <p:cSld>
-    <p:spTree>
-      <p:nvGrpSpPr>
-        <p:cNvPr id="1" name=""/>
-        <p:cNvGrpSpPr/>
-        <p:nvPr/>
-      </p:nvGrpSpPr>
-      <p:grpSpPr>
-        <a:xfrm>
-          <a:off x="0" y="0"/>
-          <a:ext cx="0" cy="0"/>
-          <a:chOff x="0" y="0"/>
-          <a:chExt cx="0" cy="0"/>
-        </a:xfrm>
-      </p:grpSpPr>
-      <p:sp>
-        <p:nvSpPr>
-          <p:cNvPr id="2" name="Title 1"/>
-          <p:cNvSpPr>
-            <a:spLocks noGrp="1"/>
-          </p:cNvSpPr>
-          <p:nvPr>
-            <p:ph type="title"/>
-          </p:nvPr>
-        </p:nvSpPr>
-        <p:spPr/>
-        <p:txBody>
-          <a:bodyPr/>
-          <a:lstStyle/>
-          <a:p>
-            <a:r>
-              <a:rPr lang="en-US" dirty="0"/>
-              <a:t>Recap: Datacenter network requirements</a:t>
-            </a:r>
-          </a:p>
-        </p:txBody>
-      </p:sp>
-      <p:sp>
-        <p:nvSpPr>
-          <p:cNvPr id="3" name="Content Placeholder 2"/>
-          <p:cNvSpPr>
-            <a:spLocks noGrp="1"/>
-          </p:cNvSpPr>
-          <p:nvPr>
-            <p:ph idx="1"/>
-          </p:nvPr>
-        </p:nvSpPr>
-        <p:spPr/>
-        <p:txBody>
-          <a:bodyPr/>
-          <a:lstStyle/>
-          <a:p>
-            <a:r>
-              <a:rPr lang="en-US" dirty="0"/>
-              <a:t>High “bisection bandwidth”</a:t>
-            </a:r>
-          </a:p>
-          <a:p>
-            <a:r>
-              <a:rPr lang="en-US" dirty="0"/>
-              <a:t>Low latency, even in the worst-case</a:t>
-            </a:r>
-          </a:p>
-          <a:p>
-            <a:r>
-              <a:rPr lang="en-US" dirty="0"/>
-              <a:t>Large scale </a:t>
-            </a:r>
-          </a:p>
-          <a:p>
-            <a:r>
-              <a:rPr lang="en-US" dirty="0"/>
-              <a:t>Low cost</a:t>
-            </a:r>
-          </a:p>
-        </p:txBody>
-      </p:sp>
-      <p:sp>
-        <p:nvSpPr>
-          <p:cNvPr id="6" name="Date Placeholder 5"/>
-          <p:cNvSpPr>
-            <a:spLocks noGrp="1"/>
-          </p:cNvSpPr>
-          <p:nvPr>
-            <p:ph type="dt" sz="half" idx="10"/>
-          </p:nvPr>
-        </p:nvSpPr>
-        <p:spPr/>
-        <p:txBody>
-          <a:bodyPr/>
-          <a:lstStyle/>
-          <a:p>
-            <a:r>
-              <a:rPr lang="en-US"/>
-              <a:t>December 1, 2021</a:t>
-            </a:r>
-            <a:endParaRPr lang="en-US" sz="1050" b="0">
-              <a:latin typeface="Times New Roman" charset="0"/>
-            </a:endParaRPr>
-          </a:p>
-        </p:txBody>
-      </p:sp>
-      <p:sp>
-        <p:nvSpPr>
-          <p:cNvPr id="7" name="Footer Placeholder 6"/>
-          <p:cNvSpPr>
-            <a:spLocks noGrp="1"/>
-          </p:cNvSpPr>
-          <p:nvPr>
-            <p:ph type="ftr" sz="quarter" idx="11"/>
-          </p:nvPr>
-        </p:nvSpPr>
-        <p:spPr/>
-        <p:txBody>
-          <a:bodyPr/>
-          <a:lstStyle/>
-          <a:p>
-            <a:r>
-              <a:rPr lang="en-US"/>
-              <a:t>EECS 489 – Lecture 20</a:t>
-            </a:r>
-            <a:endParaRPr lang="en-US" sz="1050" b="0">
-              <a:latin typeface="Times New Roman" charset="0"/>
-            </a:endParaRPr>
-          </a:p>
-        </p:txBody>
-      </p:sp>
-      <p:sp>
-        <p:nvSpPr>
-          <p:cNvPr id="4" name="Slide Number Placeholder 3">
-            <a:extLst>
-              <a:ext uri="{FF2B5EF4-FFF2-40B4-BE49-F238E27FC236}">
-                <a16:creationId xmlns:a16="http://schemas.microsoft.com/office/drawing/2014/main" id="{AF8AD4BD-624C-AC4B-B619-74ACA9D0AF72}"/>
-              </a:ext>
-            </a:extLst>
-          </p:cNvPr>
-          <p:cNvSpPr>
-            <a:spLocks noGrp="1"/>
-          </p:cNvSpPr>
-          <p:nvPr>
-            <p:ph type="sldNum" sz="quarter" idx="12"/>
-          </p:nvPr>
-        </p:nvSpPr>
-        <p:spPr/>
-        <p:txBody>
-          <a:bodyPr/>
-          <a:lstStyle/>
-          <a:p>
-            <a:fld id="{A190D881-957A-7944-A8D0-1584E528B88F}" type="slidenum">
-              <a:rPr lang="en-US" smtClean="0"/>
-              <a:pPr/>
-              <a:t>3</a:t>
-            </a:fld>
-            <a:endParaRPr lang="en-US"/>
-          </a:p>
-        </p:txBody>
-      </p:sp>
-    </p:spTree>
-    <p:extLst>
-      <p:ext uri="{BB962C8B-B14F-4D97-AF65-F5344CB8AC3E}">
-        <p14:creationId xmlns:p14="http://schemas.microsoft.com/office/powerpoint/2010/main" val="1862289730"/>
-      </p:ext>
-    </p:extLst>
-  </p:cSld>
-  <p:clrMapOvr>
-    <a:masterClrMapping/>
-  </p:clrMapOvr>
-</p:sld>
-</file>
-
-<file path=ppt/slides/slide30.xml><?xml version="1.0" encoding="utf-8"?>
+<file path=ppt/slides/slide32.xml><?xml version="1.0" encoding="utf-8"?>
 <p:sld xmlns:a="http://schemas.openxmlformats.org/drawingml/2006/main" xmlns:r="http://schemas.openxmlformats.org/officeDocument/2006/relationships" xmlns:p="http://schemas.openxmlformats.org/presentationml/2006/main">
   <p:cSld>
     <p:spTree>
@@ -25381,7 +25734,7 @@
             <a:fld id="{9507A418-0CEB-9E4A-BA45-3B7D3D133EB9}" type="slidenum">
               <a:rPr lang="en-US" smtClean="0"/>
               <a:pPr/>
-              <a:t>30</a:t>
+              <a:t>32</a:t>
             </a:fld>
             <a:endParaRPr lang="en-US"/>
           </a:p>
@@ -25411,7 +25764,7 @@
 </p:sld>
 </file>
 
-<file path=ppt/slides/slide31.xml><?xml version="1.0" encoding="utf-8"?>
+<file path=ppt/slides/slide33.xml><?xml version="1.0" encoding="utf-8"?>
 <p:sld xmlns:a="http://schemas.openxmlformats.org/drawingml/2006/main" xmlns:r="http://schemas.openxmlformats.org/officeDocument/2006/relationships" xmlns:p="http://schemas.openxmlformats.org/presentationml/2006/main">
   <p:cSld>
     <p:spTree>
@@ -25606,7 +25959,7 @@
             <a:fld id="{A190D881-957A-7944-A8D0-1584E528B88F}" type="slidenum">
               <a:rPr lang="en-US" smtClean="0"/>
               <a:pPr/>
-              <a:t>31</a:t>
+              <a:t>33</a:t>
             </a:fld>
             <a:endParaRPr lang="en-US"/>
           </a:p>
@@ -25963,7 +26316,7 @@
 </p:sld>
 </file>
 
-<file path=ppt/slides/slide32.xml><?xml version="1.0" encoding="utf-8"?>
+<file path=ppt/slides/slide34.xml><?xml version="1.0" encoding="utf-8"?>
 <p:sld xmlns:a="http://schemas.openxmlformats.org/drawingml/2006/main" xmlns:r="http://schemas.openxmlformats.org/officeDocument/2006/relationships" xmlns:p="http://schemas.openxmlformats.org/presentationml/2006/main">
   <p:cSld>
     <p:spTree>
@@ -26124,7 +26477,7 @@
             <a:fld id="{A190D881-957A-7944-A8D0-1584E528B88F}" type="slidenum">
               <a:rPr lang="en-US" smtClean="0"/>
               <a:pPr/>
-              <a:t>32</a:t>
+              <a:t>34</a:t>
             </a:fld>
             <a:endParaRPr lang="en-US"/>
           </a:p>
@@ -26253,7 +26606,7 @@
 </p:sld>
 </file>
 
-<file path=ppt/slides/slide33.xml><?xml version="1.0" encoding="utf-8"?>
+<file path=ppt/slides/slide35.xml><?xml version="1.0" encoding="utf-8"?>
 <p:sld xmlns:a="http://schemas.openxmlformats.org/drawingml/2006/main" xmlns:r="http://schemas.openxmlformats.org/officeDocument/2006/relationships" xmlns:p="http://schemas.openxmlformats.org/presentationml/2006/main">
   <p:cSld>
     <p:spTree>
@@ -26434,7 +26787,7 @@
             <a:fld id="{A190D881-957A-7944-A8D0-1584E528B88F}" type="slidenum">
               <a:rPr lang="en-US" smtClean="0"/>
               <a:pPr/>
-              <a:t>33</a:t>
+              <a:t>35</a:t>
             </a:fld>
             <a:endParaRPr lang="en-US"/>
           </a:p>
@@ -26453,7 +26806,7 @@
 </p:sld>
 </file>
 
-<file path=ppt/slides/slide34.xml><?xml version="1.0" encoding="utf-8"?>
+<file path=ppt/slides/slide36.xml><?xml version="1.0" encoding="utf-8"?>
 <p:sld xmlns:a="http://schemas.openxmlformats.org/drawingml/2006/main" xmlns:r="http://schemas.openxmlformats.org/officeDocument/2006/relationships" xmlns:p="http://schemas.openxmlformats.org/presentationml/2006/main">
   <p:cSld>
     <p:spTree>
@@ -28635,7 +28988,7 @@
             <a:fld id="{9507A418-0CEB-9E4A-BA45-3B7D3D133EB9}" type="slidenum">
               <a:rPr lang="en-US" smtClean="0"/>
               <a:pPr/>
-              <a:t>34</a:t>
+              <a:t>36</a:t>
             </a:fld>
             <a:endParaRPr lang="en-US"/>
           </a:p>
@@ -28732,7 +29085,7 @@
 </p:sld>
 </file>
 
-<file path=ppt/slides/slide35.xml><?xml version="1.0" encoding="utf-8"?>
+<file path=ppt/slides/slide37.xml><?xml version="1.0" encoding="utf-8"?>
 <p:sld xmlns:a="http://schemas.openxmlformats.org/drawingml/2006/main" xmlns:r="http://schemas.openxmlformats.org/officeDocument/2006/relationships" xmlns:p="http://schemas.openxmlformats.org/presentationml/2006/main">
   <p:cSld>
     <p:spTree>
@@ -30183,7 +30536,7 @@
             <a:fld id="{9507A418-0CEB-9E4A-BA45-3B7D3D133EB9}" type="slidenum">
               <a:rPr lang="en-US" smtClean="0"/>
               <a:pPr/>
-              <a:t>35</a:t>
+              <a:t>37</a:t>
             </a:fld>
             <a:endParaRPr lang="en-US"/>
           </a:p>
@@ -31013,7 +31366,7 @@
 </p:sld>
 </file>
 
-<file path=ppt/slides/slide36.xml><?xml version="1.0" encoding="utf-8"?>
+<file path=ppt/slides/slide38.xml><?xml version="1.0" encoding="utf-8"?>
 <p:sld xmlns:a="http://schemas.openxmlformats.org/drawingml/2006/main" xmlns:r="http://schemas.openxmlformats.org/officeDocument/2006/relationships" xmlns:p="http://schemas.openxmlformats.org/presentationml/2006/main">
   <p:cSld>
     <p:spTree>
@@ -32524,7 +32877,7 @@
             <a:fld id="{A190D881-957A-7944-A8D0-1584E528B88F}" type="slidenum">
               <a:rPr lang="en-US" smtClean="0"/>
               <a:pPr/>
-              <a:t>36</a:t>
+              <a:t>38</a:t>
             </a:fld>
             <a:endParaRPr lang="en-US"/>
           </a:p>
@@ -32730,7 +33083,7 @@
 </p:sld>
 </file>
 
-<file path=ppt/slides/slide37.xml><?xml version="1.0" encoding="utf-8"?>
+<file path=ppt/slides/slide39.xml><?xml version="1.0" encoding="utf-8"?>
 <p:sld xmlns:a="http://schemas.openxmlformats.org/drawingml/2006/main" xmlns:r="http://schemas.openxmlformats.org/officeDocument/2006/relationships" xmlns:p="http://schemas.openxmlformats.org/presentationml/2006/main">
   <p:cSld>
     <p:spTree>
@@ -37679,7 +38032,7 @@
             <a:fld id="{9507A418-0CEB-9E4A-BA45-3B7D3D133EB9}" type="slidenum">
               <a:rPr lang="en-US" smtClean="0"/>
               <a:pPr/>
-              <a:t>37</a:t>
+              <a:t>39</a:t>
             </a:fld>
             <a:endParaRPr lang="en-US"/>
           </a:p>
@@ -39130,421 +39483,6 @@
 </p:sld>
 </file>
 
-<file path=ppt/slides/slide38.xml><?xml version="1.0" encoding="utf-8"?>
-<p:sld xmlns:a="http://schemas.openxmlformats.org/drawingml/2006/main" xmlns:r="http://schemas.openxmlformats.org/officeDocument/2006/relationships" xmlns:p="http://schemas.openxmlformats.org/presentationml/2006/main">
-  <p:cSld>
-    <p:spTree>
-      <p:nvGrpSpPr>
-        <p:cNvPr id="1" name=""/>
-        <p:cNvGrpSpPr/>
-        <p:nvPr/>
-      </p:nvGrpSpPr>
-      <p:grpSpPr>
-        <a:xfrm>
-          <a:off x="0" y="0"/>
-          <a:ext cx="0" cy="0"/>
-          <a:chOff x="0" y="0"/>
-          <a:chExt cx="0" cy="0"/>
-        </a:xfrm>
-      </p:grpSpPr>
-      <p:sp>
-        <p:nvSpPr>
-          <p:cNvPr id="2" name="Title 1"/>
-          <p:cNvSpPr>
-            <a:spLocks noGrp="1"/>
-          </p:cNvSpPr>
-          <p:nvPr>
-            <p:ph type="title"/>
-          </p:nvPr>
-        </p:nvSpPr>
-        <p:spPr/>
-        <p:txBody>
-          <a:bodyPr/>
-          <a:lstStyle/>
-          <a:p>
-            <a:r>
-              <a:rPr lang="en-US" dirty="0"/>
-              <a:t>Summary</a:t>
-            </a:r>
-          </a:p>
-        </p:txBody>
-      </p:sp>
-      <p:sp>
-        <p:nvSpPr>
-          <p:cNvPr id="3" name="Content Placeholder 2"/>
-          <p:cNvSpPr>
-            <a:spLocks noGrp="1"/>
-          </p:cNvSpPr>
-          <p:nvPr>
-            <p:ph idx="1"/>
-          </p:nvPr>
-        </p:nvSpPr>
-        <p:spPr/>
-        <p:txBody>
-          <a:bodyPr/>
-          <a:lstStyle/>
-          <a:p>
-            <a:r>
-              <a:rPr lang="en-US" dirty="0"/>
-              <a:t>Networking in modern datacenters</a:t>
-            </a:r>
-          </a:p>
-          <a:p>
-            <a:pPr lvl="1"/>
-            <a:r>
-              <a:rPr lang="en-US" dirty="0">
-                <a:solidFill>
-                  <a:srgbClr val="0000FF"/>
-                </a:solidFill>
-              </a:rPr>
-              <a:t>L2/L3:</a:t>
-            </a:r>
-            <a:r>
-              <a:rPr lang="en-US" dirty="0"/>
-              <a:t> Source routing and load balancing to exploit multiple paths over the Clos topology</a:t>
-            </a:r>
-          </a:p>
-          <a:p>
-            <a:pPr lvl="1"/>
-            <a:r>
-              <a:rPr lang="en-US" dirty="0">
-                <a:solidFill>
-                  <a:srgbClr val="0000FF"/>
-                </a:solidFill>
-              </a:rPr>
-              <a:t>L4:</a:t>
-            </a:r>
-            <a:r>
-              <a:rPr lang="en-US" dirty="0"/>
-              <a:t> Find a better balance between latency and throughput requirements</a:t>
-            </a:r>
-          </a:p>
-          <a:p>
-            <a:pPr lvl="1"/>
-            <a:r>
-              <a:rPr lang="en-US" dirty="0">
-                <a:solidFill>
-                  <a:srgbClr val="0000FF"/>
-                </a:solidFill>
-              </a:rPr>
-              <a:t>L7:</a:t>
-            </a:r>
-            <a:r>
-              <a:rPr lang="en-US" dirty="0"/>
-              <a:t> Exploit application-level information with </a:t>
-            </a:r>
-            <a:r>
-              <a:rPr lang="en-US" dirty="0" err="1">
-                <a:solidFill>
-                  <a:srgbClr val="0000FF"/>
-                </a:solidFill>
-              </a:rPr>
-              <a:t>coflows</a:t>
-            </a:r>
-            <a:endParaRPr lang="en-US" dirty="0"/>
-          </a:p>
-          <a:p>
-            <a:r>
-              <a:rPr lang="en-US" dirty="0"/>
-              <a:t>Teaching evaluations</a:t>
-            </a:r>
-          </a:p>
-          <a:p>
-            <a:pPr lvl="1"/>
-            <a:r>
-              <a:rPr lang="en-US" dirty="0"/>
-              <a:t>75% or higher completion rate will result in </a:t>
-            </a:r>
-            <a:r>
-              <a:rPr lang="en-US" dirty="0">
-                <a:solidFill>
-                  <a:srgbClr val="0000FF"/>
-                </a:solidFill>
-              </a:rPr>
-              <a:t>+1 on the final grade for everyone</a:t>
-            </a:r>
-          </a:p>
-          <a:p>
-            <a:r>
-              <a:rPr lang="en-US" dirty="0">
-                <a:solidFill>
-                  <a:srgbClr val="0000FF"/>
-                </a:solidFill>
-              </a:rPr>
-              <a:t>Last class</a:t>
-            </a:r>
-            <a:r>
-              <a:rPr lang="en-US" dirty="0"/>
-              <a:t>: Final Review</a:t>
-            </a:r>
-          </a:p>
-        </p:txBody>
-      </p:sp>
-      <p:sp>
-        <p:nvSpPr>
-          <p:cNvPr id="4" name="Date Placeholder 3"/>
-          <p:cNvSpPr>
-            <a:spLocks noGrp="1"/>
-          </p:cNvSpPr>
-          <p:nvPr>
-            <p:ph type="dt" sz="half" idx="10"/>
-          </p:nvPr>
-        </p:nvSpPr>
-        <p:spPr/>
-        <p:txBody>
-          <a:bodyPr/>
-          <a:lstStyle/>
-          <a:p>
-            <a:r>
-              <a:rPr lang="en-US"/>
-              <a:t>December 1, 2021</a:t>
-            </a:r>
-            <a:endParaRPr lang="en-US" sz="1050" b="0">
-              <a:latin typeface="Times New Roman" charset="0"/>
-            </a:endParaRPr>
-          </a:p>
-        </p:txBody>
-      </p:sp>
-      <p:sp>
-        <p:nvSpPr>
-          <p:cNvPr id="5" name="Footer Placeholder 4"/>
-          <p:cNvSpPr>
-            <a:spLocks noGrp="1"/>
-          </p:cNvSpPr>
-          <p:nvPr>
-            <p:ph type="ftr" sz="quarter" idx="11"/>
-          </p:nvPr>
-        </p:nvSpPr>
-        <p:spPr/>
-        <p:txBody>
-          <a:bodyPr/>
-          <a:lstStyle/>
-          <a:p>
-            <a:r>
-              <a:rPr lang="en-US"/>
-              <a:t>EECS 489 – Lecture 20</a:t>
-            </a:r>
-            <a:endParaRPr lang="en-US" sz="1050" b="0">
-              <a:latin typeface="Times New Roman" charset="0"/>
-            </a:endParaRPr>
-          </a:p>
-        </p:txBody>
-      </p:sp>
-      <p:sp>
-        <p:nvSpPr>
-          <p:cNvPr id="7" name="Slide Number Placeholder 6">
-            <a:extLst>
-              <a:ext uri="{FF2B5EF4-FFF2-40B4-BE49-F238E27FC236}">
-                <a16:creationId xmlns:a16="http://schemas.microsoft.com/office/drawing/2014/main" id="{3CC97160-56B7-EB44-9B7A-49440AD18DFC}"/>
-              </a:ext>
-            </a:extLst>
-          </p:cNvPr>
-          <p:cNvSpPr>
-            <a:spLocks noGrp="1"/>
-          </p:cNvSpPr>
-          <p:nvPr>
-            <p:ph type="sldNum" sz="quarter" idx="12"/>
-          </p:nvPr>
-        </p:nvSpPr>
-        <p:spPr/>
-        <p:txBody>
-          <a:bodyPr/>
-          <a:lstStyle/>
-          <a:p>
-            <a:fld id="{A190D881-957A-7944-A8D0-1584E528B88F}" type="slidenum">
-              <a:rPr lang="en-US" smtClean="0"/>
-              <a:pPr/>
-              <a:t>38</a:t>
-            </a:fld>
-            <a:endParaRPr lang="en-US"/>
-          </a:p>
-        </p:txBody>
-      </p:sp>
-    </p:spTree>
-    <p:extLst>
-      <p:ext uri="{BB962C8B-B14F-4D97-AF65-F5344CB8AC3E}">
-        <p14:creationId xmlns:p14="http://schemas.microsoft.com/office/powerpoint/2010/main" val="124938130"/>
-      </p:ext>
-    </p:extLst>
-  </p:cSld>
-  <p:clrMapOvr>
-    <a:masterClrMapping/>
-  </p:clrMapOvr>
-</p:sld>
-</file>
-
-<file path=ppt/slides/slide39.xml><?xml version="1.0" encoding="utf-8"?>
-<p:sld xmlns:a="http://schemas.openxmlformats.org/drawingml/2006/main" xmlns:r="http://schemas.openxmlformats.org/officeDocument/2006/relationships" xmlns:p="http://schemas.openxmlformats.org/presentationml/2006/main">
-  <p:cSld>
-    <p:spTree>
-      <p:nvGrpSpPr>
-        <p:cNvPr id="1" name=""/>
-        <p:cNvGrpSpPr/>
-        <p:nvPr/>
-      </p:nvGrpSpPr>
-      <p:grpSpPr>
-        <a:xfrm>
-          <a:off x="0" y="0"/>
-          <a:ext cx="0" cy="0"/>
-          <a:chOff x="0" y="0"/>
-          <a:chExt cx="0" cy="0"/>
-        </a:xfrm>
-      </p:grpSpPr>
-      <p:sp>
-        <p:nvSpPr>
-          <p:cNvPr id="2" name="Title 1">
-            <a:extLst>
-              <a:ext uri="{FF2B5EF4-FFF2-40B4-BE49-F238E27FC236}">
-                <a16:creationId xmlns:a16="http://schemas.microsoft.com/office/drawing/2014/main" id="{983E6538-A3D2-5849-B7E3-AB3ADA7B438B}"/>
-              </a:ext>
-            </a:extLst>
-          </p:cNvPr>
-          <p:cNvSpPr>
-            <a:spLocks noGrp="1"/>
-          </p:cNvSpPr>
-          <p:nvPr>
-            <p:ph type="title"/>
-          </p:nvPr>
-        </p:nvSpPr>
-        <p:spPr/>
-        <p:txBody>
-          <a:bodyPr/>
-          <a:lstStyle/>
-          <a:p>
-            <a:endParaRPr lang="en-US"/>
-          </a:p>
-        </p:txBody>
-      </p:sp>
-      <p:sp>
-        <p:nvSpPr>
-          <p:cNvPr id="3" name="Content Placeholder 2">
-            <a:extLst>
-              <a:ext uri="{FF2B5EF4-FFF2-40B4-BE49-F238E27FC236}">
-                <a16:creationId xmlns:a16="http://schemas.microsoft.com/office/drawing/2014/main" id="{7D5E2DF2-4CA2-8F47-BE24-E1BE6A5BCAA3}"/>
-              </a:ext>
-            </a:extLst>
-          </p:cNvPr>
-          <p:cNvSpPr>
-            <a:spLocks noGrp="1"/>
-          </p:cNvSpPr>
-          <p:nvPr>
-            <p:ph idx="1"/>
-          </p:nvPr>
-        </p:nvSpPr>
-        <p:spPr/>
-        <p:txBody>
-          <a:bodyPr/>
-          <a:lstStyle/>
-          <a:p>
-            <a:endParaRPr lang="en-US"/>
-          </a:p>
-        </p:txBody>
-      </p:sp>
-      <p:sp>
-        <p:nvSpPr>
-          <p:cNvPr id="4" name="Date Placeholder 3">
-            <a:extLst>
-              <a:ext uri="{FF2B5EF4-FFF2-40B4-BE49-F238E27FC236}">
-                <a16:creationId xmlns:a16="http://schemas.microsoft.com/office/drawing/2014/main" id="{524BF23B-0C12-7D47-B217-97391E37D479}"/>
-              </a:ext>
-            </a:extLst>
-          </p:cNvPr>
-          <p:cNvSpPr>
-            <a:spLocks noGrp="1"/>
-          </p:cNvSpPr>
-          <p:nvPr>
-            <p:ph type="dt" sz="half" idx="10"/>
-          </p:nvPr>
-        </p:nvSpPr>
-        <p:spPr/>
-        <p:txBody>
-          <a:bodyPr/>
-          <a:lstStyle/>
-          <a:p>
-            <a:r>
-              <a:rPr lang="en-US"/>
-              <a:t>December 1, 2021</a:t>
-            </a:r>
-            <a:endParaRPr lang="en-US" sz="1050" b="0">
-              <a:latin typeface="Times New Roman" charset="0"/>
-            </a:endParaRPr>
-          </a:p>
-        </p:txBody>
-      </p:sp>
-      <p:sp>
-        <p:nvSpPr>
-          <p:cNvPr id="5" name="Footer Placeholder 4">
-            <a:extLst>
-              <a:ext uri="{FF2B5EF4-FFF2-40B4-BE49-F238E27FC236}">
-                <a16:creationId xmlns:a16="http://schemas.microsoft.com/office/drawing/2014/main" id="{A7A323FA-92D1-204C-AF2C-9F64C71F5FCD}"/>
-              </a:ext>
-            </a:extLst>
-          </p:cNvPr>
-          <p:cNvSpPr>
-            <a:spLocks noGrp="1"/>
-          </p:cNvSpPr>
-          <p:nvPr>
-            <p:ph type="ftr" sz="quarter" idx="11"/>
-          </p:nvPr>
-        </p:nvSpPr>
-        <p:spPr/>
-        <p:txBody>
-          <a:bodyPr/>
-          <a:lstStyle/>
-          <a:p>
-            <a:r>
-              <a:rPr lang="en-US"/>
-              <a:t>EECS 489 – Lecture 20</a:t>
-            </a:r>
-            <a:endParaRPr lang="en-US" sz="1050" b="0">
-              <a:latin typeface="Times New Roman" charset="0"/>
-            </a:endParaRPr>
-          </a:p>
-        </p:txBody>
-      </p:sp>
-      <p:sp>
-        <p:nvSpPr>
-          <p:cNvPr id="6" name="Slide Number Placeholder 5">
-            <a:extLst>
-              <a:ext uri="{FF2B5EF4-FFF2-40B4-BE49-F238E27FC236}">
-                <a16:creationId xmlns:a16="http://schemas.microsoft.com/office/drawing/2014/main" id="{B3522E58-206C-1D45-8AED-334DFE0CC533}"/>
-              </a:ext>
-            </a:extLst>
-          </p:cNvPr>
-          <p:cNvSpPr>
-            <a:spLocks noGrp="1"/>
-          </p:cNvSpPr>
-          <p:nvPr>
-            <p:ph type="sldNum" sz="quarter" idx="12"/>
-          </p:nvPr>
-        </p:nvSpPr>
-        <p:spPr/>
-        <p:txBody>
-          <a:bodyPr/>
-          <a:lstStyle/>
-          <a:p>
-            <a:fld id="{A190D881-957A-7944-A8D0-1584E528B88F}" type="slidenum">
-              <a:rPr lang="en-US" smtClean="0"/>
-              <a:pPr/>
-              <a:t>39</a:t>
-            </a:fld>
-            <a:endParaRPr lang="en-US"/>
-          </a:p>
-        </p:txBody>
-      </p:sp>
-    </p:spTree>
-    <p:extLst>
-      <p:ext uri="{BB962C8B-B14F-4D97-AF65-F5344CB8AC3E}">
-        <p14:creationId xmlns:p14="http://schemas.microsoft.com/office/powerpoint/2010/main" val="965187263"/>
-      </p:ext>
-    </p:extLst>
-  </p:cSld>
-  <p:clrMapOvr>
-    <a:masterClrMapping/>
-  </p:clrMapOvr>
-</p:sld>
-</file>
-
 <file path=ppt/slides/slide4.xml><?xml version="1.0" encoding="utf-8"?>
 <p:sld xmlns:a="http://schemas.openxmlformats.org/drawingml/2006/main" xmlns:r="http://schemas.openxmlformats.org/officeDocument/2006/relationships" xmlns:p="http://schemas.openxmlformats.org/presentationml/2006/main">
   <p:cSld>
@@ -43225,6 +43163,407 @@
           <a:p>
             <a:r>
               <a:rPr lang="en-US" dirty="0"/>
+              <a:t>Summary</a:t>
+            </a:r>
+          </a:p>
+        </p:txBody>
+      </p:sp>
+      <p:sp>
+        <p:nvSpPr>
+          <p:cNvPr id="3" name="Content Placeholder 2"/>
+          <p:cNvSpPr>
+            <a:spLocks noGrp="1"/>
+          </p:cNvSpPr>
+          <p:nvPr>
+            <p:ph idx="1"/>
+          </p:nvPr>
+        </p:nvSpPr>
+        <p:spPr/>
+        <p:txBody>
+          <a:bodyPr/>
+          <a:lstStyle/>
+          <a:p>
+            <a:r>
+              <a:rPr lang="en-US" dirty="0"/>
+              <a:t>Networking in modern datacenters</a:t>
+            </a:r>
+          </a:p>
+          <a:p>
+            <a:pPr lvl="1"/>
+            <a:r>
+              <a:rPr lang="en-US" dirty="0">
+                <a:solidFill>
+                  <a:srgbClr val="0000FF"/>
+                </a:solidFill>
+              </a:rPr>
+              <a:t>L2/L3:</a:t>
+            </a:r>
+            <a:r>
+              <a:rPr lang="en-US" dirty="0"/>
+              <a:t> Source routing and load balancing to exploit multiple paths over the Clos topology</a:t>
+            </a:r>
+          </a:p>
+          <a:p>
+            <a:pPr lvl="1"/>
+            <a:r>
+              <a:rPr lang="en-US" dirty="0">
+                <a:solidFill>
+                  <a:srgbClr val="0000FF"/>
+                </a:solidFill>
+              </a:rPr>
+              <a:t>L4:</a:t>
+            </a:r>
+            <a:r>
+              <a:rPr lang="en-US" dirty="0"/>
+              <a:t> Find a better balance between latency and throughput requirements</a:t>
+            </a:r>
+          </a:p>
+          <a:p>
+            <a:pPr lvl="1"/>
+            <a:r>
+              <a:rPr lang="en-US" dirty="0">
+                <a:solidFill>
+                  <a:srgbClr val="0000FF"/>
+                </a:solidFill>
+              </a:rPr>
+              <a:t>L7:</a:t>
+            </a:r>
+            <a:r>
+              <a:rPr lang="en-US" dirty="0"/>
+              <a:t> Exploit application-level information with </a:t>
+            </a:r>
+            <a:r>
+              <a:rPr lang="en-US" dirty="0" err="1">
+                <a:solidFill>
+                  <a:srgbClr val="0000FF"/>
+                </a:solidFill>
+              </a:rPr>
+              <a:t>coflows</a:t>
+            </a:r>
+            <a:endParaRPr lang="en-US" dirty="0"/>
+          </a:p>
+          <a:p>
+            <a:endParaRPr lang="en-US" dirty="0">
+              <a:solidFill>
+                <a:srgbClr val="0000FF"/>
+              </a:solidFill>
+            </a:endParaRPr>
+          </a:p>
+          <a:p>
+            <a:r>
+              <a:rPr lang="en-US" dirty="0">
+                <a:solidFill>
+                  <a:srgbClr val="0000FF"/>
+                </a:solidFill>
+              </a:rPr>
+              <a:t>Last class</a:t>
+            </a:r>
+            <a:r>
+              <a:rPr lang="en-US" dirty="0"/>
+              <a:t>: Final Review</a:t>
+            </a:r>
+          </a:p>
+        </p:txBody>
+      </p:sp>
+      <p:sp>
+        <p:nvSpPr>
+          <p:cNvPr id="4" name="Date Placeholder 3"/>
+          <p:cNvSpPr>
+            <a:spLocks noGrp="1"/>
+          </p:cNvSpPr>
+          <p:nvPr>
+            <p:ph type="dt" sz="half" idx="10"/>
+          </p:nvPr>
+        </p:nvSpPr>
+        <p:spPr/>
+        <p:txBody>
+          <a:bodyPr/>
+          <a:lstStyle/>
+          <a:p>
+            <a:r>
+              <a:rPr lang="en-US"/>
+              <a:t>December 1, 2021</a:t>
+            </a:r>
+            <a:endParaRPr lang="en-US" sz="1050" b="0">
+              <a:latin typeface="Times New Roman" charset="0"/>
+            </a:endParaRPr>
+          </a:p>
+        </p:txBody>
+      </p:sp>
+      <p:sp>
+        <p:nvSpPr>
+          <p:cNvPr id="5" name="Footer Placeholder 4"/>
+          <p:cNvSpPr>
+            <a:spLocks noGrp="1"/>
+          </p:cNvSpPr>
+          <p:nvPr>
+            <p:ph type="ftr" sz="quarter" idx="11"/>
+          </p:nvPr>
+        </p:nvSpPr>
+        <p:spPr/>
+        <p:txBody>
+          <a:bodyPr/>
+          <a:lstStyle/>
+          <a:p>
+            <a:r>
+              <a:rPr lang="en-US"/>
+              <a:t>EECS 489 – Lecture 20</a:t>
+            </a:r>
+            <a:endParaRPr lang="en-US" sz="1050" b="0">
+              <a:latin typeface="Times New Roman" charset="0"/>
+            </a:endParaRPr>
+          </a:p>
+        </p:txBody>
+      </p:sp>
+      <p:sp>
+        <p:nvSpPr>
+          <p:cNvPr id="7" name="Slide Number Placeholder 6">
+            <a:extLst>
+              <a:ext uri="{FF2B5EF4-FFF2-40B4-BE49-F238E27FC236}">
+                <a16:creationId xmlns:a16="http://schemas.microsoft.com/office/drawing/2014/main" id="{3CC97160-56B7-EB44-9B7A-49440AD18DFC}"/>
+              </a:ext>
+            </a:extLst>
+          </p:cNvPr>
+          <p:cNvSpPr>
+            <a:spLocks noGrp="1"/>
+          </p:cNvSpPr>
+          <p:nvPr>
+            <p:ph type="sldNum" sz="quarter" idx="12"/>
+          </p:nvPr>
+        </p:nvSpPr>
+        <p:spPr/>
+        <p:txBody>
+          <a:bodyPr/>
+          <a:lstStyle/>
+          <a:p>
+            <a:fld id="{A190D881-957A-7944-A8D0-1584E528B88F}" type="slidenum">
+              <a:rPr lang="en-US" smtClean="0"/>
+              <a:pPr/>
+              <a:t>40</a:t>
+            </a:fld>
+            <a:endParaRPr lang="en-US"/>
+          </a:p>
+        </p:txBody>
+      </p:sp>
+    </p:spTree>
+    <p:extLst>
+      <p:ext uri="{BB962C8B-B14F-4D97-AF65-F5344CB8AC3E}">
+        <p14:creationId xmlns:p14="http://schemas.microsoft.com/office/powerpoint/2010/main" val="124938130"/>
+      </p:ext>
+    </p:extLst>
+  </p:cSld>
+  <p:clrMapOvr>
+    <a:masterClrMapping/>
+  </p:clrMapOvr>
+</p:sld>
+</file>
+
+<file path=ppt/slides/slide41.xml><?xml version="1.0" encoding="utf-8"?>
+<p:sld xmlns:a="http://schemas.openxmlformats.org/drawingml/2006/main" xmlns:r="http://schemas.openxmlformats.org/officeDocument/2006/relationships" xmlns:p="http://schemas.openxmlformats.org/presentationml/2006/main">
+  <p:cSld>
+    <p:spTree>
+      <p:nvGrpSpPr>
+        <p:cNvPr id="1" name=""/>
+        <p:cNvGrpSpPr/>
+        <p:nvPr/>
+      </p:nvGrpSpPr>
+      <p:grpSpPr>
+        <a:xfrm>
+          <a:off x="0" y="0"/>
+          <a:ext cx="0" cy="0"/>
+          <a:chOff x="0" y="0"/>
+          <a:chExt cx="0" cy="0"/>
+        </a:xfrm>
+      </p:grpSpPr>
+      <p:sp>
+        <p:nvSpPr>
+          <p:cNvPr id="2" name="Title 1">
+            <a:extLst>
+              <a:ext uri="{FF2B5EF4-FFF2-40B4-BE49-F238E27FC236}">
+                <a16:creationId xmlns:a16="http://schemas.microsoft.com/office/drawing/2014/main" id="{983E6538-A3D2-5849-B7E3-AB3ADA7B438B}"/>
+              </a:ext>
+            </a:extLst>
+          </p:cNvPr>
+          <p:cNvSpPr>
+            <a:spLocks noGrp="1"/>
+          </p:cNvSpPr>
+          <p:nvPr>
+            <p:ph type="title"/>
+          </p:nvPr>
+        </p:nvSpPr>
+        <p:spPr/>
+        <p:txBody>
+          <a:bodyPr/>
+          <a:lstStyle/>
+          <a:p>
+            <a:endParaRPr lang="en-US"/>
+          </a:p>
+        </p:txBody>
+      </p:sp>
+      <p:sp>
+        <p:nvSpPr>
+          <p:cNvPr id="3" name="Content Placeholder 2">
+            <a:extLst>
+              <a:ext uri="{FF2B5EF4-FFF2-40B4-BE49-F238E27FC236}">
+                <a16:creationId xmlns:a16="http://schemas.microsoft.com/office/drawing/2014/main" id="{7D5E2DF2-4CA2-8F47-BE24-E1BE6A5BCAA3}"/>
+              </a:ext>
+            </a:extLst>
+          </p:cNvPr>
+          <p:cNvSpPr>
+            <a:spLocks noGrp="1"/>
+          </p:cNvSpPr>
+          <p:nvPr>
+            <p:ph idx="1"/>
+          </p:nvPr>
+        </p:nvSpPr>
+        <p:spPr/>
+        <p:txBody>
+          <a:bodyPr/>
+          <a:lstStyle/>
+          <a:p>
+            <a:endParaRPr lang="en-US"/>
+          </a:p>
+        </p:txBody>
+      </p:sp>
+      <p:sp>
+        <p:nvSpPr>
+          <p:cNvPr id="4" name="Date Placeholder 3">
+            <a:extLst>
+              <a:ext uri="{FF2B5EF4-FFF2-40B4-BE49-F238E27FC236}">
+                <a16:creationId xmlns:a16="http://schemas.microsoft.com/office/drawing/2014/main" id="{524BF23B-0C12-7D47-B217-97391E37D479}"/>
+              </a:ext>
+            </a:extLst>
+          </p:cNvPr>
+          <p:cNvSpPr>
+            <a:spLocks noGrp="1"/>
+          </p:cNvSpPr>
+          <p:nvPr>
+            <p:ph type="dt" sz="half" idx="10"/>
+          </p:nvPr>
+        </p:nvSpPr>
+        <p:spPr/>
+        <p:txBody>
+          <a:bodyPr/>
+          <a:lstStyle/>
+          <a:p>
+            <a:r>
+              <a:rPr lang="en-US"/>
+              <a:t>December 1, 2021</a:t>
+            </a:r>
+            <a:endParaRPr lang="en-US" sz="1050" b="0">
+              <a:latin typeface="Times New Roman" charset="0"/>
+            </a:endParaRPr>
+          </a:p>
+        </p:txBody>
+      </p:sp>
+      <p:sp>
+        <p:nvSpPr>
+          <p:cNvPr id="5" name="Footer Placeholder 4">
+            <a:extLst>
+              <a:ext uri="{FF2B5EF4-FFF2-40B4-BE49-F238E27FC236}">
+                <a16:creationId xmlns:a16="http://schemas.microsoft.com/office/drawing/2014/main" id="{A7A323FA-92D1-204C-AF2C-9F64C71F5FCD}"/>
+              </a:ext>
+            </a:extLst>
+          </p:cNvPr>
+          <p:cNvSpPr>
+            <a:spLocks noGrp="1"/>
+          </p:cNvSpPr>
+          <p:nvPr>
+            <p:ph type="ftr" sz="quarter" idx="11"/>
+          </p:nvPr>
+        </p:nvSpPr>
+        <p:spPr/>
+        <p:txBody>
+          <a:bodyPr/>
+          <a:lstStyle/>
+          <a:p>
+            <a:r>
+              <a:rPr lang="en-US"/>
+              <a:t>EECS 489 – Lecture 20</a:t>
+            </a:r>
+            <a:endParaRPr lang="en-US" sz="1050" b="0">
+              <a:latin typeface="Times New Roman" charset="0"/>
+            </a:endParaRPr>
+          </a:p>
+        </p:txBody>
+      </p:sp>
+      <p:sp>
+        <p:nvSpPr>
+          <p:cNvPr id="6" name="Slide Number Placeholder 5">
+            <a:extLst>
+              <a:ext uri="{FF2B5EF4-FFF2-40B4-BE49-F238E27FC236}">
+                <a16:creationId xmlns:a16="http://schemas.microsoft.com/office/drawing/2014/main" id="{B3522E58-206C-1D45-8AED-334DFE0CC533}"/>
+              </a:ext>
+            </a:extLst>
+          </p:cNvPr>
+          <p:cNvSpPr>
+            <a:spLocks noGrp="1"/>
+          </p:cNvSpPr>
+          <p:nvPr>
+            <p:ph type="sldNum" sz="quarter" idx="12"/>
+          </p:nvPr>
+        </p:nvSpPr>
+        <p:spPr/>
+        <p:txBody>
+          <a:bodyPr/>
+          <a:lstStyle/>
+          <a:p>
+            <a:fld id="{A190D881-957A-7944-A8D0-1584E528B88F}" type="slidenum">
+              <a:rPr lang="en-US" smtClean="0"/>
+              <a:pPr/>
+              <a:t>41</a:t>
+            </a:fld>
+            <a:endParaRPr lang="en-US"/>
+          </a:p>
+        </p:txBody>
+      </p:sp>
+    </p:spTree>
+    <p:extLst>
+      <p:ext uri="{BB962C8B-B14F-4D97-AF65-F5344CB8AC3E}">
+        <p14:creationId xmlns:p14="http://schemas.microsoft.com/office/powerpoint/2010/main" val="965187263"/>
+      </p:ext>
+    </p:extLst>
+  </p:cSld>
+  <p:clrMapOvr>
+    <a:masterClrMapping/>
+  </p:clrMapOvr>
+</p:sld>
+</file>
+
+<file path=ppt/slides/slide42.xml><?xml version="1.0" encoding="utf-8"?>
+<p:sld xmlns:a="http://schemas.openxmlformats.org/drawingml/2006/main" xmlns:r="http://schemas.openxmlformats.org/officeDocument/2006/relationships" xmlns:p="http://schemas.openxmlformats.org/presentationml/2006/main">
+  <p:cSld>
+    <p:spTree>
+      <p:nvGrpSpPr>
+        <p:cNvPr id="1" name=""/>
+        <p:cNvGrpSpPr/>
+        <p:nvPr/>
+      </p:nvGrpSpPr>
+      <p:grpSpPr>
+        <a:xfrm>
+          <a:off x="0" y="0"/>
+          <a:ext cx="0" cy="0"/>
+          <a:chOff x="0" y="0"/>
+          <a:chExt cx="0" cy="0"/>
+        </a:xfrm>
+      </p:grpSpPr>
+      <p:sp>
+        <p:nvSpPr>
+          <p:cNvPr id="2" name="Title 1"/>
+          <p:cNvSpPr>
+            <a:spLocks noGrp="1"/>
+          </p:cNvSpPr>
+          <p:nvPr>
+            <p:ph type="title"/>
+          </p:nvPr>
+        </p:nvSpPr>
+        <p:spPr/>
+        <p:txBody>
+          <a:bodyPr/>
+          <a:lstStyle/>
+          <a:p>
+            <a:r>
+              <a:rPr lang="en-US" dirty="0"/>
               <a:t>TCP w/ per-packet load balancing</a:t>
             </a:r>
           </a:p>
@@ -43382,7 +43721,7 @@
             <a:fld id="{A190D881-957A-7944-A8D0-1584E528B88F}" type="slidenum">
               <a:rPr lang="en-US" smtClean="0"/>
               <a:pPr/>
-              <a:t>40</a:t>
+              <a:t>42</a:t>
             </a:fld>
             <a:endParaRPr lang="en-US"/>
           </a:p>
@@ -43787,7 +44126,7 @@
 </p:sld>
 </file>
 
-<file path=ppt/slides/slide41.xml><?xml version="1.0" encoding="utf-8"?>
+<file path=ppt/slides/slide43.xml><?xml version="1.0" encoding="utf-8"?>
 <p:sld xmlns:a="http://schemas.openxmlformats.org/drawingml/2006/main" xmlns:r="http://schemas.openxmlformats.org/officeDocument/2006/relationships" xmlns:p="http://schemas.openxmlformats.org/presentationml/2006/main">
   <p:cSld>
     <p:spTree>
@@ -43929,7 +44268,7 @@
             <a:fld id="{A190D881-957A-7944-A8D0-1584E528B88F}" type="slidenum">
               <a:rPr lang="en-US" smtClean="0"/>
               <a:pPr/>
-              <a:t>41</a:t>
+              <a:t>43</a:t>
             </a:fld>
             <a:endParaRPr lang="en-US"/>
           </a:p>
@@ -43948,7 +44287,7 @@
 </p:sld>
 </file>
 
-<file path=ppt/slides/slide42.xml><?xml version="1.0" encoding="utf-8"?>
+<file path=ppt/slides/slide44.xml><?xml version="1.0" encoding="utf-8"?>
 <p:sld xmlns:a="http://schemas.openxmlformats.org/drawingml/2006/main" xmlns:r="http://schemas.openxmlformats.org/officeDocument/2006/relationships" xmlns:p="http://schemas.openxmlformats.org/presentationml/2006/main">
   <p:cSld>
     <p:spTree>
@@ -44123,7 +44462,7 @@
             <a:fld id="{A190D881-957A-7944-A8D0-1584E528B88F}" type="slidenum">
               <a:rPr lang="en-US" smtClean="0"/>
               <a:pPr/>
-              <a:t>42</a:t>
+              <a:t>44</a:t>
             </a:fld>
             <a:endParaRPr lang="en-US"/>
           </a:p>
@@ -44433,7 +44772,7 @@
 </p:sld>
 </file>
 
-<file path=ppt/slides/slide43.xml><?xml version="1.0" encoding="utf-8"?>
+<file path=ppt/slides/slide45.xml><?xml version="1.0" encoding="utf-8"?>
 <p:sld xmlns:a="http://schemas.openxmlformats.org/drawingml/2006/main" xmlns:r="http://schemas.openxmlformats.org/officeDocument/2006/relationships" xmlns:p="http://schemas.openxmlformats.org/presentationml/2006/main">
   <p:cSld>
     <p:spTree>
@@ -44658,7 +44997,7 @@
             <a:fld id="{A190D881-957A-7944-A8D0-1584E528B88F}" type="slidenum">
               <a:rPr lang="en-US" smtClean="0"/>
               <a:pPr/>
-              <a:t>43</a:t>
+              <a:t>45</a:t>
             </a:fld>
             <a:endParaRPr lang="en-US"/>
           </a:p>
@@ -45058,7 +45397,7 @@
 </p:sld>
 </file>
 
-<file path=ppt/slides/slide44.xml><?xml version="1.0" encoding="utf-8"?>
+<file path=ppt/slides/slide46.xml><?xml version="1.0" encoding="utf-8"?>
 <p:sld xmlns:a="http://schemas.openxmlformats.org/drawingml/2006/main" xmlns:r="http://schemas.openxmlformats.org/officeDocument/2006/relationships" xmlns:p="http://schemas.openxmlformats.org/presentationml/2006/main">
   <p:cSld>
     <p:spTree>
@@ -45267,7 +45606,7 @@
             <a:fld id="{A190D881-957A-7944-A8D0-1584E528B88F}" type="slidenum">
               <a:rPr lang="en-US" smtClean="0"/>
               <a:pPr/>
-              <a:t>44</a:t>
+              <a:t>46</a:t>
             </a:fld>
             <a:endParaRPr lang="en-US"/>
           </a:p>
@@ -45505,7 +45844,7 @@
 </p:sld>
 </file>
 
-<file path=ppt/slides/slide45.xml><?xml version="1.0" encoding="utf-8"?>
+<file path=ppt/slides/slide47.xml><?xml version="1.0" encoding="utf-8"?>
 <p:sld xmlns:a="http://schemas.openxmlformats.org/drawingml/2006/main" xmlns:r="http://schemas.openxmlformats.org/officeDocument/2006/relationships" xmlns:p="http://schemas.openxmlformats.org/presentationml/2006/main">
   <p:cSld>
     <p:spTree>
@@ -45668,7 +46007,7 @@
             <a:fld id="{A190D881-957A-7944-A8D0-1584E528B88F}" type="slidenum">
               <a:rPr lang="en-US" smtClean="0"/>
               <a:pPr/>
-              <a:t>45</a:t>
+              <a:t>47</a:t>
             </a:fld>
             <a:endParaRPr lang="en-US"/>
           </a:p>
@@ -45926,7 +46265,7 @@
 </p:sld>
 </file>
 
-<file path=ppt/slides/slide46.xml><?xml version="1.0" encoding="utf-8"?>
+<file path=ppt/slides/slide48.xml><?xml version="1.0" encoding="utf-8"?>
 <p:sld xmlns:a="http://schemas.openxmlformats.org/drawingml/2006/main" xmlns:r="http://schemas.openxmlformats.org/officeDocument/2006/relationships" xmlns:p="http://schemas.openxmlformats.org/presentationml/2006/main">
   <p:cSld>
     <p:spTree>
@@ -46087,7 +46426,7 @@
             <a:fld id="{A190D881-957A-7944-A8D0-1584E528B88F}" type="slidenum">
               <a:rPr lang="en-US" smtClean="0"/>
               <a:pPr/>
-              <a:t>46</a:t>
+              <a:t>48</a:t>
             </a:fld>
             <a:endParaRPr lang="en-US"/>
           </a:p>

</xml_diff>